<commit_message>
Update Session - 01 - Setting Up Environment.pptx
</commit_message>
<xml_diff>
--- a/Session - 01 - Setting Up Environment.pptx
+++ b/Session - 01 - Setting Up Environment.pptx
@@ -133,7 +133,7 @@
   </p:defaultTextStyle>
   <p:extLst>
     <p:ext uri="{EFAFB233-063F-42B5-8137-9DF3F51BA10A}">
-      <p15:sldGuideLst xmlns:p15="http://schemas.microsoft.com/office/powerpoint/2012/main">
+      <p15:sldGuideLst xmlns:p15="http://schemas.microsoft.com/office/powerpoint/2012/main" xmlns="">
         <p15:guide id="1" orient="horz" pos="1620">
           <p15:clr>
             <a:srgbClr val="A4A3A4"/>
@@ -147,7 +147,7 @@
       </p15:sldGuideLst>
     </p:ext>
     <p:ext uri="{2D200454-40CA-4A62-9FC3-DE9A4176ACB9}">
-      <p15:notesGuideLst xmlns:p15="http://schemas.microsoft.com/office/powerpoint/2012/main"/>
+      <p15:notesGuideLst xmlns:p15="http://schemas.microsoft.com/office/powerpoint/2012/main" xmlns=""/>
     </p:ext>
   </p:extLst>
 </p:presentation>
@@ -180,7 +180,7 @@
           <p:cNvPr id="2" name="Header Placeholder 1">
             <a:extLst>
               <a:ext uri="{FF2B5EF4-FFF2-40B4-BE49-F238E27FC236}">
-                <a16:creationId xmlns:a16="http://schemas.microsoft.com/office/drawing/2014/main" id="{99A11BDF-D511-467E-BC29-300D76F95039}"/>
+                <a16:creationId xmlns:a16="http://schemas.microsoft.com/office/drawing/2014/main" xmlns="" id="{99A11BDF-D511-467E-BC29-300D76F95039}"/>
               </a:ext>
             </a:extLst>
           </p:cNvPr>
@@ -217,7 +217,7 @@
           <p:cNvPr id="3" name="Date Placeholder 2">
             <a:extLst>
               <a:ext uri="{FF2B5EF4-FFF2-40B4-BE49-F238E27FC236}">
-                <a16:creationId xmlns:a16="http://schemas.microsoft.com/office/drawing/2014/main" id="{9CB6C47F-D8AE-4278-82CD-FBE4C4231E38}"/>
+                <a16:creationId xmlns:a16="http://schemas.microsoft.com/office/drawing/2014/main" xmlns="" id="{9CB6C47F-D8AE-4278-82CD-FBE4C4231E38}"/>
               </a:ext>
             </a:extLst>
           </p:cNvPr>
@@ -247,7 +247,7 @@
           <a:p>
             <a:fld id="{DED1520B-FC62-4CEC-BEB2-0827672D8325}" type="datetimeFigureOut">
               <a:rPr lang="en-IN" smtClean="0"/>
-              <a:t>01-02-2019</a:t>
+              <a:t>19-01-2020</a:t>
             </a:fld>
             <a:endParaRPr lang="en-IN"/>
           </a:p>
@@ -258,7 +258,7 @@
           <p:cNvPr id="4" name="Footer Placeholder 3">
             <a:extLst>
               <a:ext uri="{FF2B5EF4-FFF2-40B4-BE49-F238E27FC236}">
-                <a16:creationId xmlns:a16="http://schemas.microsoft.com/office/drawing/2014/main" id="{1DE210D0-623D-4F28-9390-9EC1CC62929B}"/>
+                <a16:creationId xmlns:a16="http://schemas.microsoft.com/office/drawing/2014/main" xmlns="" id="{1DE210D0-623D-4F28-9390-9EC1CC62929B}"/>
               </a:ext>
             </a:extLst>
           </p:cNvPr>
@@ -295,7 +295,7 @@
           <p:cNvPr id="5" name="Slide Number Placeholder 4">
             <a:extLst>
               <a:ext uri="{FF2B5EF4-FFF2-40B4-BE49-F238E27FC236}">
-                <a16:creationId xmlns:a16="http://schemas.microsoft.com/office/drawing/2014/main" id="{0B4CB82D-D372-4BBC-B24E-86D0E0D2FC0A}"/>
+                <a16:creationId xmlns:a16="http://schemas.microsoft.com/office/drawing/2014/main" xmlns="" id="{0B4CB82D-D372-4BBC-B24E-86D0E0D2FC0A}"/>
               </a:ext>
             </a:extLst>
           </p:cNvPr>
@@ -424,7 +424,7 @@
           <a:p>
             <a:fld id="{15C2EB4C-6C51-46D7-857D-B5CD7A2212F7}" type="datetimeFigureOut">
               <a:rPr lang="en-US" smtClean="0"/>
-              <a:t>2/1/2019</a:t>
+              <a:t>1/19/2020</a:t>
             </a:fld>
             <a:endParaRPr lang="en-US"/>
           </a:p>
@@ -1079,7 +1079,7 @@
           <p:cNvPr id="11" name="Picture 2" descr="Image result for python logo">
             <a:extLst>
               <a:ext uri="{FF2B5EF4-FFF2-40B4-BE49-F238E27FC236}">
-                <a16:creationId xmlns:a16="http://schemas.microsoft.com/office/drawing/2014/main" id="{AF0A6741-3F20-4132-9F8F-2745C6CEDF79}"/>
+                <a16:creationId xmlns:a16="http://schemas.microsoft.com/office/drawing/2014/main" xmlns="" id="{AF0A6741-3F20-4132-9F8F-2745C6CEDF79}"/>
               </a:ext>
             </a:extLst>
           </p:cNvPr>
@@ -1126,7 +1126,7 @@
           <p:cNvPr id="13" name="Picture 12" descr="A close up of a sign&#10;&#10;Description generated with very high confidence">
             <a:extLst>
               <a:ext uri="{FF2B5EF4-FFF2-40B4-BE49-F238E27FC236}">
-                <a16:creationId xmlns:a16="http://schemas.microsoft.com/office/drawing/2014/main" id="{0B0C8B3F-8426-48B5-9648-8E832C32C621}"/>
+                <a16:creationId xmlns:a16="http://schemas.microsoft.com/office/drawing/2014/main" xmlns="" id="{0B0C8B3F-8426-48B5-9648-8E832C32C621}"/>
               </a:ext>
             </a:extLst>
           </p:cNvPr>
@@ -2163,7 +2163,7 @@
           <p:cNvPr id="13" name="Picture 12" descr="A close up of a sign&#10;&#10;Description generated with very high confidence">
             <a:extLst>
               <a:ext uri="{FF2B5EF4-FFF2-40B4-BE49-F238E27FC236}">
-                <a16:creationId xmlns:a16="http://schemas.microsoft.com/office/drawing/2014/main" id="{E880A44C-9B86-4F6C-8B36-8D4EF7BFABEC}"/>
+                <a16:creationId xmlns:a16="http://schemas.microsoft.com/office/drawing/2014/main" xmlns="" id="{E880A44C-9B86-4F6C-8B36-8D4EF7BFABEC}"/>
               </a:ext>
             </a:extLst>
           </p:cNvPr>
@@ -3975,7 +3975,7 @@
           <p:cNvPr id="14" name="Straight Connector 13">
             <a:extLst>
               <a:ext uri="{FF2B5EF4-FFF2-40B4-BE49-F238E27FC236}">
-                <a16:creationId xmlns:a16="http://schemas.microsoft.com/office/drawing/2014/main" id="{4B31642E-7984-4915-8FAC-580A670CB9C3}"/>
+                <a16:creationId xmlns:a16="http://schemas.microsoft.com/office/drawing/2014/main" xmlns="" id="{4B31642E-7984-4915-8FAC-580A670CB9C3}"/>
               </a:ext>
             </a:extLst>
           </p:cNvPr>
@@ -4021,7 +4021,7 @@
           <p:cNvPr id="10" name="Picture 9" descr="A close up of a logo&#10;&#10;Description generated with high confidence">
             <a:extLst>
               <a:ext uri="{FF2B5EF4-FFF2-40B4-BE49-F238E27FC236}">
-                <a16:creationId xmlns:a16="http://schemas.microsoft.com/office/drawing/2014/main" id="{E15F7CD9-9B40-4302-947B-9F3DF686BC87}"/>
+                <a16:creationId xmlns:a16="http://schemas.microsoft.com/office/drawing/2014/main" xmlns="" id="{E15F7CD9-9B40-4302-947B-9F3DF686BC87}"/>
               </a:ext>
             </a:extLst>
           </p:cNvPr>
@@ -4430,8 +4430,23 @@
           <a:p>
             <a:r>
               <a:rPr lang="en-US" dirty="0"/>
-              <a:t>Setting up Environment</a:t>
-            </a:r>
+              <a:t>Setting up </a:t>
+            </a:r>
+            <a:r>
+              <a:rPr lang="en-US" dirty="0" smtClean="0"/>
+              <a:t>Environment</a:t>
+            </a:r>
+          </a:p>
+          <a:p>
+            <a:r>
+              <a:rPr lang="en-US" dirty="0" smtClean="0"/>
+              <a:t>Dr. </a:t>
+            </a:r>
+            <a:r>
+              <a:rPr lang="en-US" smtClean="0"/>
+              <a:t>Nidhi</a:t>
+            </a:r>
+            <a:endParaRPr lang="en-US" dirty="0"/>
           </a:p>
         </p:txBody>
       </p:sp>
@@ -4470,7 +4485,7 @@
           <p:cNvPr id="2" name="Title 1">
             <a:extLst>
               <a:ext uri="{FF2B5EF4-FFF2-40B4-BE49-F238E27FC236}">
-                <a16:creationId xmlns:a16="http://schemas.microsoft.com/office/drawing/2014/main" id="{A881ABA4-A25E-426A-BEAF-55A9D58F0752}"/>
+                <a16:creationId xmlns:a16="http://schemas.microsoft.com/office/drawing/2014/main" xmlns="" id="{A881ABA4-A25E-426A-BEAF-55A9D58F0752}"/>
               </a:ext>
             </a:extLst>
           </p:cNvPr>
@@ -4503,7 +4518,7 @@
           <p:cNvPr id="3" name="Text Placeholder 2">
             <a:extLst>
               <a:ext uri="{FF2B5EF4-FFF2-40B4-BE49-F238E27FC236}">
-                <a16:creationId xmlns:a16="http://schemas.microsoft.com/office/drawing/2014/main" id="{AA8039F4-A134-4CA5-98C7-0EEBE72BBB69}"/>
+                <a16:creationId xmlns:a16="http://schemas.microsoft.com/office/drawing/2014/main" xmlns="" id="{AA8039F4-A134-4CA5-98C7-0EEBE72BBB69}"/>
               </a:ext>
             </a:extLst>
           </p:cNvPr>
@@ -4531,7 +4546,7 @@
           <p:cNvPr id="4" name="Footer Placeholder 3">
             <a:extLst>
               <a:ext uri="{FF2B5EF4-FFF2-40B4-BE49-F238E27FC236}">
-                <a16:creationId xmlns:a16="http://schemas.microsoft.com/office/drawing/2014/main" id="{1031DABE-449F-417B-8F3E-C9D4D1C73A86}"/>
+                <a16:creationId xmlns:a16="http://schemas.microsoft.com/office/drawing/2014/main" xmlns="" id="{1031DABE-449F-417B-8F3E-C9D4D1C73A86}"/>
               </a:ext>
             </a:extLst>
           </p:cNvPr>
@@ -4590,7 +4605,7 @@
           <p:cNvPr id="2" name="Title 1">
             <a:extLst>
               <a:ext uri="{FF2B5EF4-FFF2-40B4-BE49-F238E27FC236}">
-                <a16:creationId xmlns:a16="http://schemas.microsoft.com/office/drawing/2014/main" id="{C6ECD56D-A84B-4778-9126-C7E99ABCA82C}"/>
+                <a16:creationId xmlns:a16="http://schemas.microsoft.com/office/drawing/2014/main" xmlns="" id="{C6ECD56D-A84B-4778-9126-C7E99ABCA82C}"/>
               </a:ext>
             </a:extLst>
           </p:cNvPr>
@@ -4618,7 +4633,7 @@
           <p:cNvPr id="4" name="Footer Placeholder 3">
             <a:extLst>
               <a:ext uri="{FF2B5EF4-FFF2-40B4-BE49-F238E27FC236}">
-                <a16:creationId xmlns:a16="http://schemas.microsoft.com/office/drawing/2014/main" id="{2A820C08-3A0C-45F7-9143-270D68487461}"/>
+                <a16:creationId xmlns:a16="http://schemas.microsoft.com/office/drawing/2014/main" xmlns="" id="{2A820C08-3A0C-45F7-9143-270D68487461}"/>
               </a:ext>
             </a:extLst>
           </p:cNvPr>
@@ -4647,7 +4662,7 @@
           <p:cNvPr id="5" name="Straight Connector 4">
             <a:extLst>
               <a:ext uri="{FF2B5EF4-FFF2-40B4-BE49-F238E27FC236}">
-                <a16:creationId xmlns:a16="http://schemas.microsoft.com/office/drawing/2014/main" id="{1ABD8992-2624-4A5D-B637-DEABC14C2F17}"/>
+                <a16:creationId xmlns:a16="http://schemas.microsoft.com/office/drawing/2014/main" xmlns="" id="{1ABD8992-2624-4A5D-B637-DEABC14C2F17}"/>
               </a:ext>
             </a:extLst>
           </p:cNvPr>
@@ -4690,7 +4705,7 @@
           <p:cNvPr id="8" name="TextBox 7">
             <a:extLst>
               <a:ext uri="{FF2B5EF4-FFF2-40B4-BE49-F238E27FC236}">
-                <a16:creationId xmlns:a16="http://schemas.microsoft.com/office/drawing/2014/main" id="{927E1F9F-F478-4C42-AAF9-AC47911325BF}"/>
+                <a16:creationId xmlns:a16="http://schemas.microsoft.com/office/drawing/2014/main" xmlns="" id="{927E1F9F-F478-4C42-AAF9-AC47911325BF}"/>
               </a:ext>
             </a:extLst>
           </p:cNvPr>
@@ -4734,7 +4749,7 @@
           <p:cNvPr id="10" name="TextBox 9">
             <a:extLst>
               <a:ext uri="{FF2B5EF4-FFF2-40B4-BE49-F238E27FC236}">
-                <a16:creationId xmlns:a16="http://schemas.microsoft.com/office/drawing/2014/main" id="{764AAADB-FF0D-4AFE-B0DC-EACD6457C13E}"/>
+                <a16:creationId xmlns:a16="http://schemas.microsoft.com/office/drawing/2014/main" xmlns="" id="{764AAADB-FF0D-4AFE-B0DC-EACD6457C13E}"/>
               </a:ext>
             </a:extLst>
           </p:cNvPr>
@@ -4781,7 +4796,7 @@
           <p:cNvPr id="11" name="Arrow: Curved Up 10">
             <a:extLst>
               <a:ext uri="{FF2B5EF4-FFF2-40B4-BE49-F238E27FC236}">
-                <a16:creationId xmlns:a16="http://schemas.microsoft.com/office/drawing/2014/main" id="{2BA836D4-37DF-4952-A4CA-4531DE1B7F02}"/>
+                <a16:creationId xmlns:a16="http://schemas.microsoft.com/office/drawing/2014/main" xmlns="" id="{2BA836D4-37DF-4952-A4CA-4531DE1B7F02}"/>
               </a:ext>
             </a:extLst>
           </p:cNvPr>
@@ -4841,7 +4856,7 @@
           <p:cNvPr id="13" name="Rectangle 12">
             <a:extLst>
               <a:ext uri="{FF2B5EF4-FFF2-40B4-BE49-F238E27FC236}">
-                <a16:creationId xmlns:a16="http://schemas.microsoft.com/office/drawing/2014/main" id="{945C0BB0-B509-42D7-B04E-55BBC8A43E30}"/>
+                <a16:creationId xmlns:a16="http://schemas.microsoft.com/office/drawing/2014/main" xmlns="" id="{945C0BB0-B509-42D7-B04E-55BBC8A43E30}"/>
               </a:ext>
             </a:extLst>
           </p:cNvPr>
@@ -4893,7 +4908,7 @@
           <p:cNvPr id="12" name="TextBox 11">
             <a:extLst>
               <a:ext uri="{FF2B5EF4-FFF2-40B4-BE49-F238E27FC236}">
-                <a16:creationId xmlns:a16="http://schemas.microsoft.com/office/drawing/2014/main" id="{35C19750-4F17-4E39-AB3C-097E1E6B902B}"/>
+                <a16:creationId xmlns:a16="http://schemas.microsoft.com/office/drawing/2014/main" xmlns="" id="{35C19750-4F17-4E39-AB3C-097E1E6B902B}"/>
               </a:ext>
             </a:extLst>
           </p:cNvPr>
@@ -4951,7 +4966,7 @@
           <p:cNvPr id="7" name="Group 6">
             <a:extLst>
               <a:ext uri="{FF2B5EF4-FFF2-40B4-BE49-F238E27FC236}">
-                <a16:creationId xmlns:a16="http://schemas.microsoft.com/office/drawing/2014/main" id="{4F20DEEC-0306-4B05-BF7E-EB6AA05CE340}"/>
+                <a16:creationId xmlns:a16="http://schemas.microsoft.com/office/drawing/2014/main" xmlns="" id="{4F20DEEC-0306-4B05-BF7E-EB6AA05CE340}"/>
               </a:ext>
             </a:extLst>
           </p:cNvPr>
@@ -4971,7 +4986,7 @@
             <p:cNvPr id="6" name="Picture 5">
               <a:extLst>
                 <a:ext uri="{FF2B5EF4-FFF2-40B4-BE49-F238E27FC236}">
-                  <a16:creationId xmlns:a16="http://schemas.microsoft.com/office/drawing/2014/main" id="{84C9AD0A-AD5C-4C2D-8531-7A6628113AC2}"/>
+                  <a16:creationId xmlns:a16="http://schemas.microsoft.com/office/drawing/2014/main" xmlns="" id="{84C9AD0A-AD5C-4C2D-8531-7A6628113AC2}"/>
                 </a:ext>
               </a:extLst>
             </p:cNvPr>
@@ -5000,7 +5015,7 @@
             <p:cNvPr id="14" name="Picture 13">
               <a:extLst>
                 <a:ext uri="{FF2B5EF4-FFF2-40B4-BE49-F238E27FC236}">
-                  <a16:creationId xmlns:a16="http://schemas.microsoft.com/office/drawing/2014/main" id="{BE50B4A6-9079-48EE-B55E-3B67890C6F71}"/>
+                  <a16:creationId xmlns:a16="http://schemas.microsoft.com/office/drawing/2014/main" xmlns="" id="{BE50B4A6-9079-48EE-B55E-3B67890C6F71}"/>
                 </a:ext>
               </a:extLst>
             </p:cNvPr>
@@ -5030,7 +5045,7 @@
           <p:cNvPr id="3074" name="Picture 2" descr="Image result for spyder icon">
             <a:extLst>
               <a:ext uri="{FF2B5EF4-FFF2-40B4-BE49-F238E27FC236}">
-                <a16:creationId xmlns:a16="http://schemas.microsoft.com/office/drawing/2014/main" id="{ADC36E69-C4CE-472F-8EFC-343865C10981}"/>
+                <a16:creationId xmlns:a16="http://schemas.microsoft.com/office/drawing/2014/main" xmlns="" id="{ADC36E69-C4CE-472F-8EFC-343865C10981}"/>
               </a:ext>
             </a:extLst>
           </p:cNvPr>
@@ -5107,7 +5122,7 @@
           <p:cNvPr id="2" name="Title 1">
             <a:extLst>
               <a:ext uri="{FF2B5EF4-FFF2-40B4-BE49-F238E27FC236}">
-                <a16:creationId xmlns:a16="http://schemas.microsoft.com/office/drawing/2014/main" id="{5AA1839F-4B47-4742-B67D-08D43ED62A55}"/>
+                <a16:creationId xmlns:a16="http://schemas.microsoft.com/office/drawing/2014/main" xmlns="" id="{5AA1839F-4B47-4742-B67D-08D43ED62A55}"/>
               </a:ext>
             </a:extLst>
           </p:cNvPr>
@@ -5135,7 +5150,7 @@
           <p:cNvPr id="3" name="Footer Placeholder 2">
             <a:extLst>
               <a:ext uri="{FF2B5EF4-FFF2-40B4-BE49-F238E27FC236}">
-                <a16:creationId xmlns:a16="http://schemas.microsoft.com/office/drawing/2014/main" id="{BE9E9502-A6A6-4B66-9A36-5E2EA6B8FBE3}"/>
+                <a16:creationId xmlns:a16="http://schemas.microsoft.com/office/drawing/2014/main" xmlns="" id="{BE9E9502-A6A6-4B66-9A36-5E2EA6B8FBE3}"/>
               </a:ext>
             </a:extLst>
           </p:cNvPr>
@@ -5164,7 +5179,7 @@
           <p:cNvPr id="4" name="Straight Connector 3">
             <a:extLst>
               <a:ext uri="{FF2B5EF4-FFF2-40B4-BE49-F238E27FC236}">
-                <a16:creationId xmlns:a16="http://schemas.microsoft.com/office/drawing/2014/main" id="{47841E2D-AC33-4CB7-9379-EEE96F8C30B2}"/>
+                <a16:creationId xmlns:a16="http://schemas.microsoft.com/office/drawing/2014/main" xmlns="" id="{47841E2D-AC33-4CB7-9379-EEE96F8C30B2}"/>
               </a:ext>
             </a:extLst>
           </p:cNvPr>
@@ -5207,7 +5222,7 @@
           <p:cNvPr id="5" name="Picture 4">
             <a:extLst>
               <a:ext uri="{FF2B5EF4-FFF2-40B4-BE49-F238E27FC236}">
-                <a16:creationId xmlns:a16="http://schemas.microsoft.com/office/drawing/2014/main" id="{3FA126D8-10DD-4F77-ACB4-ACFB7E8C67BC}"/>
+                <a16:creationId xmlns:a16="http://schemas.microsoft.com/office/drawing/2014/main" xmlns="" id="{3FA126D8-10DD-4F77-ACB4-ACFB7E8C67BC}"/>
               </a:ext>
             </a:extLst>
           </p:cNvPr>
@@ -5236,7 +5251,7 @@
           <p:cNvPr id="7" name="TextBox 6">
             <a:extLst>
               <a:ext uri="{FF2B5EF4-FFF2-40B4-BE49-F238E27FC236}">
-                <a16:creationId xmlns:a16="http://schemas.microsoft.com/office/drawing/2014/main" id="{F67CDA50-2E61-4B2F-8FAB-2BF75FE8E2AC}"/>
+                <a16:creationId xmlns:a16="http://schemas.microsoft.com/office/drawing/2014/main" xmlns="" id="{F67CDA50-2E61-4B2F-8FAB-2BF75FE8E2AC}"/>
               </a:ext>
             </a:extLst>
           </p:cNvPr>
@@ -5283,7 +5298,7 @@
           <p:cNvPr id="9" name="TextBox 8">
             <a:extLst>
               <a:ext uri="{FF2B5EF4-FFF2-40B4-BE49-F238E27FC236}">
-                <a16:creationId xmlns:a16="http://schemas.microsoft.com/office/drawing/2014/main" id="{DAB3CC2B-551E-4F2D-AEB3-17A1CD2066FC}"/>
+                <a16:creationId xmlns:a16="http://schemas.microsoft.com/office/drawing/2014/main" xmlns="" id="{DAB3CC2B-551E-4F2D-AEB3-17A1CD2066FC}"/>
               </a:ext>
             </a:extLst>
           </p:cNvPr>
@@ -5336,7 +5351,7 @@
           <p:cNvPr id="10" name="TextBox 9">
             <a:extLst>
               <a:ext uri="{FF2B5EF4-FFF2-40B4-BE49-F238E27FC236}">
-                <a16:creationId xmlns:a16="http://schemas.microsoft.com/office/drawing/2014/main" id="{F22CE947-9016-4B57-8581-EE5DA6890891}"/>
+                <a16:creationId xmlns:a16="http://schemas.microsoft.com/office/drawing/2014/main" xmlns="" id="{F22CE947-9016-4B57-8581-EE5DA6890891}"/>
               </a:ext>
             </a:extLst>
           </p:cNvPr>
@@ -5376,7 +5391,7 @@
           <p:cNvPr id="11" name="TextBox 10">
             <a:extLst>
               <a:ext uri="{FF2B5EF4-FFF2-40B4-BE49-F238E27FC236}">
-                <a16:creationId xmlns:a16="http://schemas.microsoft.com/office/drawing/2014/main" id="{C4A76AEF-6393-4BDE-BC5C-A66039D7B432}"/>
+                <a16:creationId xmlns:a16="http://schemas.microsoft.com/office/drawing/2014/main" xmlns="" id="{C4A76AEF-6393-4BDE-BC5C-A66039D7B432}"/>
               </a:ext>
             </a:extLst>
           </p:cNvPr>
@@ -5425,7 +5440,7 @@
           <p:cNvPr id="12" name="Speech Bubble: Rectangle 11">
             <a:extLst>
               <a:ext uri="{FF2B5EF4-FFF2-40B4-BE49-F238E27FC236}">
-                <a16:creationId xmlns:a16="http://schemas.microsoft.com/office/drawing/2014/main" id="{ADC733FF-ECBB-4859-BA2F-8510A32AF21A}"/>
+                <a16:creationId xmlns:a16="http://schemas.microsoft.com/office/drawing/2014/main" xmlns="" id="{ADC733FF-ECBB-4859-BA2F-8510A32AF21A}"/>
               </a:ext>
             </a:extLst>
           </p:cNvPr>
@@ -5521,7 +5536,7 @@
           <p:cNvPr id="2" name="Title 1">
             <a:extLst>
               <a:ext uri="{FF2B5EF4-FFF2-40B4-BE49-F238E27FC236}">
-                <a16:creationId xmlns:a16="http://schemas.microsoft.com/office/drawing/2014/main" id="{A881ABA4-A25E-426A-BEAF-55A9D58F0752}"/>
+                <a16:creationId xmlns:a16="http://schemas.microsoft.com/office/drawing/2014/main" xmlns="" id="{A881ABA4-A25E-426A-BEAF-55A9D58F0752}"/>
               </a:ext>
             </a:extLst>
           </p:cNvPr>
@@ -5549,7 +5564,7 @@
           <p:cNvPr id="3" name="Text Placeholder 2">
             <a:extLst>
               <a:ext uri="{FF2B5EF4-FFF2-40B4-BE49-F238E27FC236}">
-                <a16:creationId xmlns:a16="http://schemas.microsoft.com/office/drawing/2014/main" id="{AA8039F4-A134-4CA5-98C7-0EEBE72BBB69}"/>
+                <a16:creationId xmlns:a16="http://schemas.microsoft.com/office/drawing/2014/main" xmlns="" id="{AA8039F4-A134-4CA5-98C7-0EEBE72BBB69}"/>
               </a:ext>
             </a:extLst>
           </p:cNvPr>
@@ -5577,7 +5592,7 @@
           <p:cNvPr id="4" name="Footer Placeholder 3">
             <a:extLst>
               <a:ext uri="{FF2B5EF4-FFF2-40B4-BE49-F238E27FC236}">
-                <a16:creationId xmlns:a16="http://schemas.microsoft.com/office/drawing/2014/main" id="{1031DABE-449F-417B-8F3E-C9D4D1C73A86}"/>
+                <a16:creationId xmlns:a16="http://schemas.microsoft.com/office/drawing/2014/main" xmlns="" id="{1031DABE-449F-417B-8F3E-C9D4D1C73A86}"/>
               </a:ext>
             </a:extLst>
           </p:cNvPr>
@@ -5636,7 +5651,7 @@
           <p:cNvPr id="2" name="Title 1">
             <a:extLst>
               <a:ext uri="{FF2B5EF4-FFF2-40B4-BE49-F238E27FC236}">
-                <a16:creationId xmlns:a16="http://schemas.microsoft.com/office/drawing/2014/main" id="{C6ECD56D-A84B-4778-9126-C7E99ABCA82C}"/>
+                <a16:creationId xmlns:a16="http://schemas.microsoft.com/office/drawing/2014/main" xmlns="" id="{C6ECD56D-A84B-4778-9126-C7E99ABCA82C}"/>
               </a:ext>
             </a:extLst>
           </p:cNvPr>
@@ -5664,7 +5679,7 @@
           <p:cNvPr id="4" name="Footer Placeholder 3">
             <a:extLst>
               <a:ext uri="{FF2B5EF4-FFF2-40B4-BE49-F238E27FC236}">
-                <a16:creationId xmlns:a16="http://schemas.microsoft.com/office/drawing/2014/main" id="{2A820C08-3A0C-45F7-9143-270D68487461}"/>
+                <a16:creationId xmlns:a16="http://schemas.microsoft.com/office/drawing/2014/main" xmlns="" id="{2A820C08-3A0C-45F7-9143-270D68487461}"/>
               </a:ext>
             </a:extLst>
           </p:cNvPr>
@@ -5693,7 +5708,7 @@
           <p:cNvPr id="5" name="Straight Connector 4">
             <a:extLst>
               <a:ext uri="{FF2B5EF4-FFF2-40B4-BE49-F238E27FC236}">
-                <a16:creationId xmlns:a16="http://schemas.microsoft.com/office/drawing/2014/main" id="{1ABD8992-2624-4A5D-B637-DEABC14C2F17}"/>
+                <a16:creationId xmlns:a16="http://schemas.microsoft.com/office/drawing/2014/main" xmlns="" id="{1ABD8992-2624-4A5D-B637-DEABC14C2F17}"/>
               </a:ext>
             </a:extLst>
           </p:cNvPr>
@@ -5736,7 +5751,7 @@
           <p:cNvPr id="8" name="TextBox 7">
             <a:extLst>
               <a:ext uri="{FF2B5EF4-FFF2-40B4-BE49-F238E27FC236}">
-                <a16:creationId xmlns:a16="http://schemas.microsoft.com/office/drawing/2014/main" id="{927E1F9F-F478-4C42-AAF9-AC47911325BF}"/>
+                <a16:creationId xmlns:a16="http://schemas.microsoft.com/office/drawing/2014/main" xmlns="" id="{927E1F9F-F478-4C42-AAF9-AC47911325BF}"/>
               </a:ext>
             </a:extLst>
           </p:cNvPr>
@@ -5780,7 +5795,7 @@
           <p:cNvPr id="10" name="TextBox 9">
             <a:extLst>
               <a:ext uri="{FF2B5EF4-FFF2-40B4-BE49-F238E27FC236}">
-                <a16:creationId xmlns:a16="http://schemas.microsoft.com/office/drawing/2014/main" id="{764AAADB-FF0D-4AFE-B0DC-EACD6457C13E}"/>
+                <a16:creationId xmlns:a16="http://schemas.microsoft.com/office/drawing/2014/main" xmlns="" id="{764AAADB-FF0D-4AFE-B0DC-EACD6457C13E}"/>
               </a:ext>
             </a:extLst>
           </p:cNvPr>
@@ -5848,7 +5863,7 @@
           <p:cNvPr id="11" name="Arrow: Curved Up 10">
             <a:extLst>
               <a:ext uri="{FF2B5EF4-FFF2-40B4-BE49-F238E27FC236}">
-                <a16:creationId xmlns:a16="http://schemas.microsoft.com/office/drawing/2014/main" id="{2BA836D4-37DF-4952-A4CA-4531DE1B7F02}"/>
+                <a16:creationId xmlns:a16="http://schemas.microsoft.com/office/drawing/2014/main" xmlns="" id="{2BA836D4-37DF-4952-A4CA-4531DE1B7F02}"/>
               </a:ext>
             </a:extLst>
           </p:cNvPr>
@@ -5908,7 +5923,7 @@
           <p:cNvPr id="13" name="Rectangle 12">
             <a:extLst>
               <a:ext uri="{FF2B5EF4-FFF2-40B4-BE49-F238E27FC236}">
-                <a16:creationId xmlns:a16="http://schemas.microsoft.com/office/drawing/2014/main" id="{945C0BB0-B509-42D7-B04E-55BBC8A43E30}"/>
+                <a16:creationId xmlns:a16="http://schemas.microsoft.com/office/drawing/2014/main" xmlns="" id="{945C0BB0-B509-42D7-B04E-55BBC8A43E30}"/>
               </a:ext>
             </a:extLst>
           </p:cNvPr>
@@ -5960,7 +5975,7 @@
           <p:cNvPr id="12" name="TextBox 11">
             <a:extLst>
               <a:ext uri="{FF2B5EF4-FFF2-40B4-BE49-F238E27FC236}">
-                <a16:creationId xmlns:a16="http://schemas.microsoft.com/office/drawing/2014/main" id="{35C19750-4F17-4E39-AB3C-097E1E6B902B}"/>
+                <a16:creationId xmlns:a16="http://schemas.microsoft.com/office/drawing/2014/main" xmlns="" id="{35C19750-4F17-4E39-AB3C-097E1E6B902B}"/>
               </a:ext>
             </a:extLst>
           </p:cNvPr>
@@ -6001,7 +6016,7 @@
           <p:cNvPr id="3" name="Picture 2">
             <a:extLst>
               <a:ext uri="{FF2B5EF4-FFF2-40B4-BE49-F238E27FC236}">
-                <a16:creationId xmlns:a16="http://schemas.microsoft.com/office/drawing/2014/main" id="{ABE314A9-6867-42B2-9FBF-BF4159A75F77}"/>
+                <a16:creationId xmlns:a16="http://schemas.microsoft.com/office/drawing/2014/main" xmlns="" id="{ABE314A9-6867-42B2-9FBF-BF4159A75F77}"/>
               </a:ext>
             </a:extLst>
           </p:cNvPr>
@@ -6030,7 +6045,7 @@
           <p:cNvPr id="4098" name="Picture 2" descr="Image result for pycharm logo">
             <a:extLst>
               <a:ext uri="{FF2B5EF4-FFF2-40B4-BE49-F238E27FC236}">
-                <a16:creationId xmlns:a16="http://schemas.microsoft.com/office/drawing/2014/main" id="{471B4BB6-227F-4732-A68A-6FC7A2B02089}"/>
+                <a16:creationId xmlns:a16="http://schemas.microsoft.com/office/drawing/2014/main" xmlns="" id="{471B4BB6-227F-4732-A68A-6FC7A2B02089}"/>
               </a:ext>
             </a:extLst>
           </p:cNvPr>
@@ -6077,7 +6092,7 @@
           <p:cNvPr id="9" name="TextBox 8">
             <a:extLst>
               <a:ext uri="{FF2B5EF4-FFF2-40B4-BE49-F238E27FC236}">
-                <a16:creationId xmlns:a16="http://schemas.microsoft.com/office/drawing/2014/main" id="{51FADAC6-9BA8-4062-AF1C-CEC1BCDF0BE4}"/>
+                <a16:creationId xmlns:a16="http://schemas.microsoft.com/office/drawing/2014/main" xmlns="" id="{51FADAC6-9BA8-4062-AF1C-CEC1BCDF0BE4}"/>
               </a:ext>
             </a:extLst>
           </p:cNvPr>
@@ -6148,7 +6163,7 @@
           <p:cNvPr id="8" name="Picture 7">
             <a:extLst>
               <a:ext uri="{FF2B5EF4-FFF2-40B4-BE49-F238E27FC236}">
-                <a16:creationId xmlns:a16="http://schemas.microsoft.com/office/drawing/2014/main" id="{EF6230E2-0EAF-459C-B448-ECF77A63DE03}"/>
+                <a16:creationId xmlns:a16="http://schemas.microsoft.com/office/drawing/2014/main" xmlns="" id="{EF6230E2-0EAF-459C-B448-ECF77A63DE03}"/>
               </a:ext>
             </a:extLst>
           </p:cNvPr>
@@ -6177,7 +6192,7 @@
           <p:cNvPr id="2" name="Title 1">
             <a:extLst>
               <a:ext uri="{FF2B5EF4-FFF2-40B4-BE49-F238E27FC236}">
-                <a16:creationId xmlns:a16="http://schemas.microsoft.com/office/drawing/2014/main" id="{5AA1839F-4B47-4742-B67D-08D43ED62A55}"/>
+                <a16:creationId xmlns:a16="http://schemas.microsoft.com/office/drawing/2014/main" xmlns="" id="{5AA1839F-4B47-4742-B67D-08D43ED62A55}"/>
               </a:ext>
             </a:extLst>
           </p:cNvPr>
@@ -6205,7 +6220,7 @@
           <p:cNvPr id="3" name="Footer Placeholder 2">
             <a:extLst>
               <a:ext uri="{FF2B5EF4-FFF2-40B4-BE49-F238E27FC236}">
-                <a16:creationId xmlns:a16="http://schemas.microsoft.com/office/drawing/2014/main" id="{BE9E9502-A6A6-4B66-9A36-5E2EA6B8FBE3}"/>
+                <a16:creationId xmlns:a16="http://schemas.microsoft.com/office/drawing/2014/main" xmlns="" id="{BE9E9502-A6A6-4B66-9A36-5E2EA6B8FBE3}"/>
               </a:ext>
             </a:extLst>
           </p:cNvPr>
@@ -6234,7 +6249,7 @@
           <p:cNvPr id="4" name="Straight Connector 3">
             <a:extLst>
               <a:ext uri="{FF2B5EF4-FFF2-40B4-BE49-F238E27FC236}">
-                <a16:creationId xmlns:a16="http://schemas.microsoft.com/office/drawing/2014/main" id="{47841E2D-AC33-4CB7-9379-EEE96F8C30B2}"/>
+                <a16:creationId xmlns:a16="http://schemas.microsoft.com/office/drawing/2014/main" xmlns="" id="{47841E2D-AC33-4CB7-9379-EEE96F8C30B2}"/>
               </a:ext>
             </a:extLst>
           </p:cNvPr>
@@ -6277,7 +6292,7 @@
           <p:cNvPr id="9" name="TextBox 8">
             <a:extLst>
               <a:ext uri="{FF2B5EF4-FFF2-40B4-BE49-F238E27FC236}">
-                <a16:creationId xmlns:a16="http://schemas.microsoft.com/office/drawing/2014/main" id="{DAB3CC2B-551E-4F2D-AEB3-17A1CD2066FC}"/>
+                <a16:creationId xmlns:a16="http://schemas.microsoft.com/office/drawing/2014/main" xmlns="" id="{DAB3CC2B-551E-4F2D-AEB3-17A1CD2066FC}"/>
               </a:ext>
             </a:extLst>
           </p:cNvPr>
@@ -6319,7 +6334,7 @@
           <p:cNvPr id="10" name="TextBox 9">
             <a:extLst>
               <a:ext uri="{FF2B5EF4-FFF2-40B4-BE49-F238E27FC236}">
-                <a16:creationId xmlns:a16="http://schemas.microsoft.com/office/drawing/2014/main" id="{F22CE947-9016-4B57-8581-EE5DA6890891}"/>
+                <a16:creationId xmlns:a16="http://schemas.microsoft.com/office/drawing/2014/main" xmlns="" id="{F22CE947-9016-4B57-8581-EE5DA6890891}"/>
               </a:ext>
             </a:extLst>
           </p:cNvPr>
@@ -6366,7 +6381,7 @@
           <p:cNvPr id="11" name="TextBox 10">
             <a:extLst>
               <a:ext uri="{FF2B5EF4-FFF2-40B4-BE49-F238E27FC236}">
-                <a16:creationId xmlns:a16="http://schemas.microsoft.com/office/drawing/2014/main" id="{C4A76AEF-6393-4BDE-BC5C-A66039D7B432}"/>
+                <a16:creationId xmlns:a16="http://schemas.microsoft.com/office/drawing/2014/main" xmlns="" id="{C4A76AEF-6393-4BDE-BC5C-A66039D7B432}"/>
               </a:ext>
             </a:extLst>
           </p:cNvPr>
@@ -6415,7 +6430,7 @@
           <p:cNvPr id="12" name="Speech Bubble: Rectangle 11">
             <a:extLst>
               <a:ext uri="{FF2B5EF4-FFF2-40B4-BE49-F238E27FC236}">
-                <a16:creationId xmlns:a16="http://schemas.microsoft.com/office/drawing/2014/main" id="{ADC733FF-ECBB-4859-BA2F-8510A32AF21A}"/>
+                <a16:creationId xmlns:a16="http://schemas.microsoft.com/office/drawing/2014/main" xmlns="" id="{ADC733FF-ECBB-4859-BA2F-8510A32AF21A}"/>
               </a:ext>
             </a:extLst>
           </p:cNvPr>
@@ -6511,7 +6526,7 @@
           <p:cNvPr id="2" name="Title 1">
             <a:extLst>
               <a:ext uri="{FF2B5EF4-FFF2-40B4-BE49-F238E27FC236}">
-                <a16:creationId xmlns:a16="http://schemas.microsoft.com/office/drawing/2014/main" id="{A881ABA4-A25E-426A-BEAF-55A9D58F0752}"/>
+                <a16:creationId xmlns:a16="http://schemas.microsoft.com/office/drawing/2014/main" xmlns="" id="{A881ABA4-A25E-426A-BEAF-55A9D58F0752}"/>
               </a:ext>
             </a:extLst>
           </p:cNvPr>
@@ -6539,7 +6554,7 @@
           <p:cNvPr id="3" name="Text Placeholder 2">
             <a:extLst>
               <a:ext uri="{FF2B5EF4-FFF2-40B4-BE49-F238E27FC236}">
-                <a16:creationId xmlns:a16="http://schemas.microsoft.com/office/drawing/2014/main" id="{AA8039F4-A134-4CA5-98C7-0EEBE72BBB69}"/>
+                <a16:creationId xmlns:a16="http://schemas.microsoft.com/office/drawing/2014/main" xmlns="" id="{AA8039F4-A134-4CA5-98C7-0EEBE72BBB69}"/>
               </a:ext>
             </a:extLst>
           </p:cNvPr>
@@ -6567,7 +6582,7 @@
           <p:cNvPr id="4" name="Footer Placeholder 3">
             <a:extLst>
               <a:ext uri="{FF2B5EF4-FFF2-40B4-BE49-F238E27FC236}">
-                <a16:creationId xmlns:a16="http://schemas.microsoft.com/office/drawing/2014/main" id="{1031DABE-449F-417B-8F3E-C9D4D1C73A86}"/>
+                <a16:creationId xmlns:a16="http://schemas.microsoft.com/office/drawing/2014/main" xmlns="" id="{1031DABE-449F-417B-8F3E-C9D4D1C73A86}"/>
               </a:ext>
             </a:extLst>
           </p:cNvPr>
@@ -6626,7 +6641,7 @@
           <p:cNvPr id="14" name="Rectangle 13">
             <a:extLst>
               <a:ext uri="{FF2B5EF4-FFF2-40B4-BE49-F238E27FC236}">
-                <a16:creationId xmlns:a16="http://schemas.microsoft.com/office/drawing/2014/main" id="{00A2BE3F-40F9-4FA3-9194-BC6C6CABC6D9}"/>
+                <a16:creationId xmlns:a16="http://schemas.microsoft.com/office/drawing/2014/main" xmlns="" id="{00A2BE3F-40F9-4FA3-9194-BC6C6CABC6D9}"/>
               </a:ext>
             </a:extLst>
           </p:cNvPr>
@@ -6680,7 +6695,7 @@
           <p:cNvPr id="2" name="Title 1">
             <a:extLst>
               <a:ext uri="{FF2B5EF4-FFF2-40B4-BE49-F238E27FC236}">
-                <a16:creationId xmlns:a16="http://schemas.microsoft.com/office/drawing/2014/main" id="{C6ECD56D-A84B-4778-9126-C7E99ABCA82C}"/>
+                <a16:creationId xmlns:a16="http://schemas.microsoft.com/office/drawing/2014/main" xmlns="" id="{C6ECD56D-A84B-4778-9126-C7E99ABCA82C}"/>
               </a:ext>
             </a:extLst>
           </p:cNvPr>
@@ -6708,7 +6723,7 @@
           <p:cNvPr id="7" name="Content Placeholder 6">
             <a:extLst>
               <a:ext uri="{FF2B5EF4-FFF2-40B4-BE49-F238E27FC236}">
-                <a16:creationId xmlns:a16="http://schemas.microsoft.com/office/drawing/2014/main" id="{B8565340-5F16-4C19-B6FB-92C04B6A7CBF}"/>
+                <a16:creationId xmlns:a16="http://schemas.microsoft.com/office/drawing/2014/main" xmlns="" id="{B8565340-5F16-4C19-B6FB-92C04B6A7CBF}"/>
               </a:ext>
             </a:extLst>
           </p:cNvPr>
@@ -6855,7 +6870,7 @@
           <p:cNvPr id="4" name="Footer Placeholder 3">
             <a:extLst>
               <a:ext uri="{FF2B5EF4-FFF2-40B4-BE49-F238E27FC236}">
-                <a16:creationId xmlns:a16="http://schemas.microsoft.com/office/drawing/2014/main" id="{2A820C08-3A0C-45F7-9143-270D68487461}"/>
+                <a16:creationId xmlns:a16="http://schemas.microsoft.com/office/drawing/2014/main" xmlns="" id="{2A820C08-3A0C-45F7-9143-270D68487461}"/>
               </a:ext>
             </a:extLst>
           </p:cNvPr>
@@ -6884,7 +6899,7 @@
           <p:cNvPr id="5" name="Straight Connector 4">
             <a:extLst>
               <a:ext uri="{FF2B5EF4-FFF2-40B4-BE49-F238E27FC236}">
-                <a16:creationId xmlns:a16="http://schemas.microsoft.com/office/drawing/2014/main" id="{1ABD8992-2624-4A5D-B637-DEABC14C2F17}"/>
+                <a16:creationId xmlns:a16="http://schemas.microsoft.com/office/drawing/2014/main" xmlns="" id="{1ABD8992-2624-4A5D-B637-DEABC14C2F17}"/>
               </a:ext>
             </a:extLst>
           </p:cNvPr>
@@ -6927,7 +6942,7 @@
           <p:cNvPr id="10" name="TextBox 9">
             <a:extLst>
               <a:ext uri="{FF2B5EF4-FFF2-40B4-BE49-F238E27FC236}">
-                <a16:creationId xmlns:a16="http://schemas.microsoft.com/office/drawing/2014/main" id="{764AAADB-FF0D-4AFE-B0DC-EACD6457C13E}"/>
+                <a16:creationId xmlns:a16="http://schemas.microsoft.com/office/drawing/2014/main" xmlns="" id="{764AAADB-FF0D-4AFE-B0DC-EACD6457C13E}"/>
               </a:ext>
             </a:extLst>
           </p:cNvPr>
@@ -7043,7 +7058,7 @@
           <p:cNvPr id="15" name="TextBox 14">
             <a:extLst>
               <a:ext uri="{FF2B5EF4-FFF2-40B4-BE49-F238E27FC236}">
-                <a16:creationId xmlns:a16="http://schemas.microsoft.com/office/drawing/2014/main" id="{829B6861-8018-4BAA-BCEE-67B81BF8A695}"/>
+                <a16:creationId xmlns:a16="http://schemas.microsoft.com/office/drawing/2014/main" xmlns="" id="{829B6861-8018-4BAA-BCEE-67B81BF8A695}"/>
               </a:ext>
             </a:extLst>
           </p:cNvPr>
@@ -7115,7 +7130,7 @@
           <p:cNvPr id="2" name="Title 1">
             <a:extLst>
               <a:ext uri="{FF2B5EF4-FFF2-40B4-BE49-F238E27FC236}">
-                <a16:creationId xmlns:a16="http://schemas.microsoft.com/office/drawing/2014/main" id="{A881ABA4-A25E-426A-BEAF-55A9D58F0752}"/>
+                <a16:creationId xmlns:a16="http://schemas.microsoft.com/office/drawing/2014/main" xmlns="" id="{A881ABA4-A25E-426A-BEAF-55A9D58F0752}"/>
               </a:ext>
             </a:extLst>
           </p:cNvPr>
@@ -7148,7 +7163,7 @@
           <p:cNvPr id="3" name="Text Placeholder 2">
             <a:extLst>
               <a:ext uri="{FF2B5EF4-FFF2-40B4-BE49-F238E27FC236}">
-                <a16:creationId xmlns:a16="http://schemas.microsoft.com/office/drawing/2014/main" id="{AA8039F4-A134-4CA5-98C7-0EEBE72BBB69}"/>
+                <a16:creationId xmlns:a16="http://schemas.microsoft.com/office/drawing/2014/main" xmlns="" id="{AA8039F4-A134-4CA5-98C7-0EEBE72BBB69}"/>
               </a:ext>
             </a:extLst>
           </p:cNvPr>
@@ -7181,7 +7196,7 @@
           <p:cNvPr id="4" name="Footer Placeholder 3">
             <a:extLst>
               <a:ext uri="{FF2B5EF4-FFF2-40B4-BE49-F238E27FC236}">
-                <a16:creationId xmlns:a16="http://schemas.microsoft.com/office/drawing/2014/main" id="{1031DABE-449F-417B-8F3E-C9D4D1C73A86}"/>
+                <a16:creationId xmlns:a16="http://schemas.microsoft.com/office/drawing/2014/main" xmlns="" id="{1031DABE-449F-417B-8F3E-C9D4D1C73A86}"/>
               </a:ext>
             </a:extLst>
           </p:cNvPr>
@@ -7240,7 +7255,7 @@
           <p:cNvPr id="14" name="Rectangle 13">
             <a:extLst>
               <a:ext uri="{FF2B5EF4-FFF2-40B4-BE49-F238E27FC236}">
-                <a16:creationId xmlns:a16="http://schemas.microsoft.com/office/drawing/2014/main" id="{00A2BE3F-40F9-4FA3-9194-BC6C6CABC6D9}"/>
+                <a16:creationId xmlns:a16="http://schemas.microsoft.com/office/drawing/2014/main" xmlns="" id="{00A2BE3F-40F9-4FA3-9194-BC6C6CABC6D9}"/>
               </a:ext>
             </a:extLst>
           </p:cNvPr>
@@ -7294,7 +7309,7 @@
           <p:cNvPr id="2" name="Title 1">
             <a:extLst>
               <a:ext uri="{FF2B5EF4-FFF2-40B4-BE49-F238E27FC236}">
-                <a16:creationId xmlns:a16="http://schemas.microsoft.com/office/drawing/2014/main" id="{C6ECD56D-A84B-4778-9126-C7E99ABCA82C}"/>
+                <a16:creationId xmlns:a16="http://schemas.microsoft.com/office/drawing/2014/main" xmlns="" id="{C6ECD56D-A84B-4778-9126-C7E99ABCA82C}"/>
               </a:ext>
             </a:extLst>
           </p:cNvPr>
@@ -7322,7 +7337,7 @@
           <p:cNvPr id="7" name="Content Placeholder 6">
             <a:extLst>
               <a:ext uri="{FF2B5EF4-FFF2-40B4-BE49-F238E27FC236}">
-                <a16:creationId xmlns:a16="http://schemas.microsoft.com/office/drawing/2014/main" id="{B8565340-5F16-4C19-B6FB-92C04B6A7CBF}"/>
+                <a16:creationId xmlns:a16="http://schemas.microsoft.com/office/drawing/2014/main" xmlns="" id="{B8565340-5F16-4C19-B6FB-92C04B6A7CBF}"/>
               </a:ext>
             </a:extLst>
           </p:cNvPr>
@@ -7397,7 +7412,7 @@
           <p:cNvPr id="4" name="Footer Placeholder 3">
             <a:extLst>
               <a:ext uri="{FF2B5EF4-FFF2-40B4-BE49-F238E27FC236}">
-                <a16:creationId xmlns:a16="http://schemas.microsoft.com/office/drawing/2014/main" id="{2A820C08-3A0C-45F7-9143-270D68487461}"/>
+                <a16:creationId xmlns:a16="http://schemas.microsoft.com/office/drawing/2014/main" xmlns="" id="{2A820C08-3A0C-45F7-9143-270D68487461}"/>
               </a:ext>
             </a:extLst>
           </p:cNvPr>
@@ -7426,7 +7441,7 @@
           <p:cNvPr id="5" name="Straight Connector 4">
             <a:extLst>
               <a:ext uri="{FF2B5EF4-FFF2-40B4-BE49-F238E27FC236}">
-                <a16:creationId xmlns:a16="http://schemas.microsoft.com/office/drawing/2014/main" id="{1ABD8992-2624-4A5D-B637-DEABC14C2F17}"/>
+                <a16:creationId xmlns:a16="http://schemas.microsoft.com/office/drawing/2014/main" xmlns="" id="{1ABD8992-2624-4A5D-B637-DEABC14C2F17}"/>
               </a:ext>
             </a:extLst>
           </p:cNvPr>
@@ -7469,7 +7484,7 @@
           <p:cNvPr id="10" name="TextBox 9">
             <a:extLst>
               <a:ext uri="{FF2B5EF4-FFF2-40B4-BE49-F238E27FC236}">
-                <a16:creationId xmlns:a16="http://schemas.microsoft.com/office/drawing/2014/main" id="{764AAADB-FF0D-4AFE-B0DC-EACD6457C13E}"/>
+                <a16:creationId xmlns:a16="http://schemas.microsoft.com/office/drawing/2014/main" xmlns="" id="{764AAADB-FF0D-4AFE-B0DC-EACD6457C13E}"/>
               </a:ext>
             </a:extLst>
           </p:cNvPr>
@@ -7585,7 +7600,7 @@
           <p:cNvPr id="15" name="TextBox 14">
             <a:extLst>
               <a:ext uri="{FF2B5EF4-FFF2-40B4-BE49-F238E27FC236}">
-                <a16:creationId xmlns:a16="http://schemas.microsoft.com/office/drawing/2014/main" id="{829B6861-8018-4BAA-BCEE-67B81BF8A695}"/>
+                <a16:creationId xmlns:a16="http://schemas.microsoft.com/office/drawing/2014/main" xmlns="" id="{829B6861-8018-4BAA-BCEE-67B81BF8A695}"/>
               </a:ext>
             </a:extLst>
           </p:cNvPr>
@@ -7657,7 +7672,7 @@
           <p:cNvPr id="2" name="Title 1">
             <a:extLst>
               <a:ext uri="{FF2B5EF4-FFF2-40B4-BE49-F238E27FC236}">
-                <a16:creationId xmlns:a16="http://schemas.microsoft.com/office/drawing/2014/main" id="{A881ABA4-A25E-426A-BEAF-55A9D58F0752}"/>
+                <a16:creationId xmlns:a16="http://schemas.microsoft.com/office/drawing/2014/main" xmlns="" id="{A881ABA4-A25E-426A-BEAF-55A9D58F0752}"/>
               </a:ext>
             </a:extLst>
           </p:cNvPr>
@@ -7685,7 +7700,7 @@
           <p:cNvPr id="3" name="Text Placeholder 2">
             <a:extLst>
               <a:ext uri="{FF2B5EF4-FFF2-40B4-BE49-F238E27FC236}">
-                <a16:creationId xmlns:a16="http://schemas.microsoft.com/office/drawing/2014/main" id="{AA8039F4-A134-4CA5-98C7-0EEBE72BBB69}"/>
+                <a16:creationId xmlns:a16="http://schemas.microsoft.com/office/drawing/2014/main" xmlns="" id="{AA8039F4-A134-4CA5-98C7-0EEBE72BBB69}"/>
               </a:ext>
             </a:extLst>
           </p:cNvPr>
@@ -7716,7 +7731,7 @@
           <p:cNvPr id="4" name="Footer Placeholder 3">
             <a:extLst>
               <a:ext uri="{FF2B5EF4-FFF2-40B4-BE49-F238E27FC236}">
-                <a16:creationId xmlns:a16="http://schemas.microsoft.com/office/drawing/2014/main" id="{1031DABE-449F-417B-8F3E-C9D4D1C73A86}"/>
+                <a16:creationId xmlns:a16="http://schemas.microsoft.com/office/drawing/2014/main" xmlns="" id="{1031DABE-449F-417B-8F3E-C9D4D1C73A86}"/>
               </a:ext>
             </a:extLst>
           </p:cNvPr>
@@ -7775,7 +7790,7 @@
           <p:cNvPr id="2" name="Title 1">
             <a:extLst>
               <a:ext uri="{FF2B5EF4-FFF2-40B4-BE49-F238E27FC236}">
-                <a16:creationId xmlns:a16="http://schemas.microsoft.com/office/drawing/2014/main" id="{A881ABA4-A25E-426A-BEAF-55A9D58F0752}"/>
+                <a16:creationId xmlns:a16="http://schemas.microsoft.com/office/drawing/2014/main" xmlns="" id="{A881ABA4-A25E-426A-BEAF-55A9D58F0752}"/>
               </a:ext>
             </a:extLst>
           </p:cNvPr>
@@ -7808,7 +7823,7 @@
           <p:cNvPr id="3" name="Text Placeholder 2">
             <a:extLst>
               <a:ext uri="{FF2B5EF4-FFF2-40B4-BE49-F238E27FC236}">
-                <a16:creationId xmlns:a16="http://schemas.microsoft.com/office/drawing/2014/main" id="{AA8039F4-A134-4CA5-98C7-0EEBE72BBB69}"/>
+                <a16:creationId xmlns:a16="http://schemas.microsoft.com/office/drawing/2014/main" xmlns="" id="{AA8039F4-A134-4CA5-98C7-0EEBE72BBB69}"/>
               </a:ext>
             </a:extLst>
           </p:cNvPr>
@@ -7841,7 +7856,7 @@
           <p:cNvPr id="4" name="Footer Placeholder 3">
             <a:extLst>
               <a:ext uri="{FF2B5EF4-FFF2-40B4-BE49-F238E27FC236}">
-                <a16:creationId xmlns:a16="http://schemas.microsoft.com/office/drawing/2014/main" id="{1031DABE-449F-417B-8F3E-C9D4D1C73A86}"/>
+                <a16:creationId xmlns:a16="http://schemas.microsoft.com/office/drawing/2014/main" xmlns="" id="{1031DABE-449F-417B-8F3E-C9D4D1C73A86}"/>
               </a:ext>
             </a:extLst>
           </p:cNvPr>
@@ -7900,7 +7915,7 @@
           <p:cNvPr id="2" name="Title 1">
             <a:extLst>
               <a:ext uri="{FF2B5EF4-FFF2-40B4-BE49-F238E27FC236}">
-                <a16:creationId xmlns:a16="http://schemas.microsoft.com/office/drawing/2014/main" id="{C6ECD56D-A84B-4778-9126-C7E99ABCA82C}"/>
+                <a16:creationId xmlns:a16="http://schemas.microsoft.com/office/drawing/2014/main" xmlns="" id="{C6ECD56D-A84B-4778-9126-C7E99ABCA82C}"/>
               </a:ext>
             </a:extLst>
           </p:cNvPr>
@@ -7928,7 +7943,7 @@
           <p:cNvPr id="7" name="Content Placeholder 6">
             <a:extLst>
               <a:ext uri="{FF2B5EF4-FFF2-40B4-BE49-F238E27FC236}">
-                <a16:creationId xmlns:a16="http://schemas.microsoft.com/office/drawing/2014/main" id="{B8565340-5F16-4C19-B6FB-92C04B6A7CBF}"/>
+                <a16:creationId xmlns:a16="http://schemas.microsoft.com/office/drawing/2014/main" xmlns="" id="{B8565340-5F16-4C19-B6FB-92C04B6A7CBF}"/>
               </a:ext>
             </a:extLst>
           </p:cNvPr>
@@ -8084,7 +8099,7 @@
           <p:cNvPr id="4" name="Footer Placeholder 3">
             <a:extLst>
               <a:ext uri="{FF2B5EF4-FFF2-40B4-BE49-F238E27FC236}">
-                <a16:creationId xmlns:a16="http://schemas.microsoft.com/office/drawing/2014/main" id="{2A820C08-3A0C-45F7-9143-270D68487461}"/>
+                <a16:creationId xmlns:a16="http://schemas.microsoft.com/office/drawing/2014/main" xmlns="" id="{2A820C08-3A0C-45F7-9143-270D68487461}"/>
               </a:ext>
             </a:extLst>
           </p:cNvPr>
@@ -8113,7 +8128,7 @@
           <p:cNvPr id="5" name="Straight Connector 4">
             <a:extLst>
               <a:ext uri="{FF2B5EF4-FFF2-40B4-BE49-F238E27FC236}">
-                <a16:creationId xmlns:a16="http://schemas.microsoft.com/office/drawing/2014/main" id="{1ABD8992-2624-4A5D-B637-DEABC14C2F17}"/>
+                <a16:creationId xmlns:a16="http://schemas.microsoft.com/office/drawing/2014/main" xmlns="" id="{1ABD8992-2624-4A5D-B637-DEABC14C2F17}"/>
               </a:ext>
             </a:extLst>
           </p:cNvPr>
@@ -8311,7 +8326,7 @@
           <p:cNvPr id="6" name="Straight Connector 5">
             <a:extLst>
               <a:ext uri="{FF2B5EF4-FFF2-40B4-BE49-F238E27FC236}">
-                <a16:creationId xmlns:a16="http://schemas.microsoft.com/office/drawing/2014/main" id="{77EB2974-6707-4284-B0CE-F7C3FFB9D998}"/>
+                <a16:creationId xmlns:a16="http://schemas.microsoft.com/office/drawing/2014/main" xmlns="" id="{77EB2974-6707-4284-B0CE-F7C3FFB9D998}"/>
               </a:ext>
             </a:extLst>
           </p:cNvPr>
@@ -8384,7 +8399,7 @@
           <p:cNvPr id="2" name="Title 1">
             <a:extLst>
               <a:ext uri="{FF2B5EF4-FFF2-40B4-BE49-F238E27FC236}">
-                <a16:creationId xmlns:a16="http://schemas.microsoft.com/office/drawing/2014/main" id="{C6ECD56D-A84B-4778-9126-C7E99ABCA82C}"/>
+                <a16:creationId xmlns:a16="http://schemas.microsoft.com/office/drawing/2014/main" xmlns="" id="{C6ECD56D-A84B-4778-9126-C7E99ABCA82C}"/>
               </a:ext>
             </a:extLst>
           </p:cNvPr>
@@ -8412,7 +8427,7 @@
           <p:cNvPr id="13" name="Content Placeholder 12" descr="Download">
             <a:extLst>
               <a:ext uri="{FF2B5EF4-FFF2-40B4-BE49-F238E27FC236}">
-                <a16:creationId xmlns:a16="http://schemas.microsoft.com/office/drawing/2014/main" id="{B2C18C47-672B-45FC-A1F0-2E01F0409892}"/>
+                <a16:creationId xmlns:a16="http://schemas.microsoft.com/office/drawing/2014/main" xmlns="" id="{B2C18C47-672B-45FC-A1F0-2E01F0409892}"/>
               </a:ext>
             </a:extLst>
           </p:cNvPr>
@@ -8424,13 +8439,13 @@
           </p:nvPr>
         </p:nvPicPr>
         <p:blipFill>
-          <a:blip r:embed="rId2">
+          <a:blip r:embed="rId2" cstate="print">
             <a:extLst>
               <a:ext uri="{28A0092B-C50C-407E-A947-70E740481C1C}">
                 <a14:useLocalDpi xmlns:a14="http://schemas.microsoft.com/office/drawing/2010/main" val="0"/>
               </a:ext>
               <a:ext uri="{96DAC541-7B7A-43D3-8B79-37D633B846F1}">
-                <asvg:svgBlip xmlns:asvg="http://schemas.microsoft.com/office/drawing/2016/SVG/main" r:embed="rId3"/>
+                <asvg:svgBlip xmlns:asvg="http://schemas.microsoft.com/office/drawing/2016/SVG/main" xmlns="" r:embed="rId3"/>
               </a:ext>
             </a:extLst>
           </a:blip>
@@ -8450,7 +8465,7 @@
           <p:cNvPr id="4" name="Footer Placeholder 3">
             <a:extLst>
               <a:ext uri="{FF2B5EF4-FFF2-40B4-BE49-F238E27FC236}">
-                <a16:creationId xmlns:a16="http://schemas.microsoft.com/office/drawing/2014/main" id="{2A820C08-3A0C-45F7-9143-270D68487461}"/>
+                <a16:creationId xmlns:a16="http://schemas.microsoft.com/office/drawing/2014/main" xmlns="" id="{2A820C08-3A0C-45F7-9143-270D68487461}"/>
               </a:ext>
             </a:extLst>
           </p:cNvPr>
@@ -8479,7 +8494,7 @@
           <p:cNvPr id="5" name="Straight Connector 4">
             <a:extLst>
               <a:ext uri="{FF2B5EF4-FFF2-40B4-BE49-F238E27FC236}">
-                <a16:creationId xmlns:a16="http://schemas.microsoft.com/office/drawing/2014/main" id="{0CDE77F3-B01F-4BBD-B350-05B9EECE271B}"/>
+                <a16:creationId xmlns:a16="http://schemas.microsoft.com/office/drawing/2014/main" xmlns="" id="{0CDE77F3-B01F-4BBD-B350-05B9EECE271B}"/>
               </a:ext>
             </a:extLst>
           </p:cNvPr>
@@ -8522,7 +8537,7 @@
           <p:cNvPr id="14" name="TextBox 13">
             <a:extLst>
               <a:ext uri="{FF2B5EF4-FFF2-40B4-BE49-F238E27FC236}">
-                <a16:creationId xmlns:a16="http://schemas.microsoft.com/office/drawing/2014/main" id="{95811153-9823-4B0B-B6BD-31546966EAF8}"/>
+                <a16:creationId xmlns:a16="http://schemas.microsoft.com/office/drawing/2014/main" xmlns="" id="{95811153-9823-4B0B-B6BD-31546966EAF8}"/>
               </a:ext>
             </a:extLst>
           </p:cNvPr>
@@ -8569,7 +8584,7 @@
           <p:cNvPr id="15" name="TextBox 14">
             <a:extLst>
               <a:ext uri="{FF2B5EF4-FFF2-40B4-BE49-F238E27FC236}">
-                <a16:creationId xmlns:a16="http://schemas.microsoft.com/office/drawing/2014/main" id="{17EEE99E-6CC3-4FC4-8C22-8405A38198E9}"/>
+                <a16:creationId xmlns:a16="http://schemas.microsoft.com/office/drawing/2014/main" xmlns="" id="{17EEE99E-6CC3-4FC4-8C22-8405A38198E9}"/>
               </a:ext>
             </a:extLst>
           </p:cNvPr>
@@ -8611,7 +8626,7 @@
           <p:cNvPr id="16" name="TextBox 15">
             <a:extLst>
               <a:ext uri="{FF2B5EF4-FFF2-40B4-BE49-F238E27FC236}">
-                <a16:creationId xmlns:a16="http://schemas.microsoft.com/office/drawing/2014/main" id="{229247EF-0DEF-4C56-BF2A-BA83E02B9506}"/>
+                <a16:creationId xmlns:a16="http://schemas.microsoft.com/office/drawing/2014/main" xmlns="" id="{229247EF-0DEF-4C56-BF2A-BA83E02B9506}"/>
               </a:ext>
             </a:extLst>
           </p:cNvPr>
@@ -8655,7 +8670,7 @@
           <p:cNvPr id="17" name="TextBox 16">
             <a:extLst>
               <a:ext uri="{FF2B5EF4-FFF2-40B4-BE49-F238E27FC236}">
-                <a16:creationId xmlns:a16="http://schemas.microsoft.com/office/drawing/2014/main" id="{8380B95D-5E71-4DE3-8FDD-7EBABC550A44}"/>
+                <a16:creationId xmlns:a16="http://schemas.microsoft.com/office/drawing/2014/main" xmlns="" id="{8380B95D-5E71-4DE3-8FDD-7EBABC550A44}"/>
               </a:ext>
             </a:extLst>
           </p:cNvPr>
@@ -8725,7 +8740,7 @@
           <p:cNvPr id="2" name="Title 1">
             <a:extLst>
               <a:ext uri="{FF2B5EF4-FFF2-40B4-BE49-F238E27FC236}">
-                <a16:creationId xmlns:a16="http://schemas.microsoft.com/office/drawing/2014/main" id="{A881ABA4-A25E-426A-BEAF-55A9D58F0752}"/>
+                <a16:creationId xmlns:a16="http://schemas.microsoft.com/office/drawing/2014/main" xmlns="" id="{A881ABA4-A25E-426A-BEAF-55A9D58F0752}"/>
               </a:ext>
             </a:extLst>
           </p:cNvPr>
@@ -8753,7 +8768,7 @@
           <p:cNvPr id="3" name="Text Placeholder 2">
             <a:extLst>
               <a:ext uri="{FF2B5EF4-FFF2-40B4-BE49-F238E27FC236}">
-                <a16:creationId xmlns:a16="http://schemas.microsoft.com/office/drawing/2014/main" id="{AA8039F4-A134-4CA5-98C7-0EEBE72BBB69}"/>
+                <a16:creationId xmlns:a16="http://schemas.microsoft.com/office/drawing/2014/main" xmlns="" id="{AA8039F4-A134-4CA5-98C7-0EEBE72BBB69}"/>
               </a:ext>
             </a:extLst>
           </p:cNvPr>
@@ -8781,7 +8796,7 @@
           <p:cNvPr id="4" name="Footer Placeholder 3">
             <a:extLst>
               <a:ext uri="{FF2B5EF4-FFF2-40B4-BE49-F238E27FC236}">
-                <a16:creationId xmlns:a16="http://schemas.microsoft.com/office/drawing/2014/main" id="{1031DABE-449F-417B-8F3E-C9D4D1C73A86}"/>
+                <a16:creationId xmlns:a16="http://schemas.microsoft.com/office/drawing/2014/main" xmlns="" id="{1031DABE-449F-417B-8F3E-C9D4D1C73A86}"/>
               </a:ext>
             </a:extLst>
           </p:cNvPr>
@@ -8840,7 +8855,7 @@
           <p:cNvPr id="2" name="Title 1">
             <a:extLst>
               <a:ext uri="{FF2B5EF4-FFF2-40B4-BE49-F238E27FC236}">
-                <a16:creationId xmlns:a16="http://schemas.microsoft.com/office/drawing/2014/main" id="{C6ECD56D-A84B-4778-9126-C7E99ABCA82C}"/>
+                <a16:creationId xmlns:a16="http://schemas.microsoft.com/office/drawing/2014/main" xmlns="" id="{C6ECD56D-A84B-4778-9126-C7E99ABCA82C}"/>
               </a:ext>
             </a:extLst>
           </p:cNvPr>
@@ -8868,7 +8883,7 @@
           <p:cNvPr id="13" name="Content Placeholder 12" descr="Download">
             <a:extLst>
               <a:ext uri="{FF2B5EF4-FFF2-40B4-BE49-F238E27FC236}">
-                <a16:creationId xmlns:a16="http://schemas.microsoft.com/office/drawing/2014/main" id="{B2C18C47-672B-45FC-A1F0-2E01F0409892}"/>
+                <a16:creationId xmlns:a16="http://schemas.microsoft.com/office/drawing/2014/main" xmlns="" id="{B2C18C47-672B-45FC-A1F0-2E01F0409892}"/>
               </a:ext>
             </a:extLst>
           </p:cNvPr>
@@ -8880,13 +8895,13 @@
           </p:nvPr>
         </p:nvPicPr>
         <p:blipFill>
-          <a:blip r:embed="rId2">
+          <a:blip r:embed="rId2" cstate="print">
             <a:extLst>
               <a:ext uri="{28A0092B-C50C-407E-A947-70E740481C1C}">
                 <a14:useLocalDpi xmlns:a14="http://schemas.microsoft.com/office/drawing/2010/main" val="0"/>
               </a:ext>
               <a:ext uri="{96DAC541-7B7A-43D3-8B79-37D633B846F1}">
-                <asvg:svgBlip xmlns:asvg="http://schemas.microsoft.com/office/drawing/2016/SVG/main" r:embed="rId3"/>
+                <asvg:svgBlip xmlns:asvg="http://schemas.microsoft.com/office/drawing/2016/SVG/main" xmlns="" r:embed="rId3"/>
               </a:ext>
             </a:extLst>
           </a:blip>
@@ -8906,7 +8921,7 @@
           <p:cNvPr id="4" name="Footer Placeholder 3">
             <a:extLst>
               <a:ext uri="{FF2B5EF4-FFF2-40B4-BE49-F238E27FC236}">
-                <a16:creationId xmlns:a16="http://schemas.microsoft.com/office/drawing/2014/main" id="{2A820C08-3A0C-45F7-9143-270D68487461}"/>
+                <a16:creationId xmlns:a16="http://schemas.microsoft.com/office/drawing/2014/main" xmlns="" id="{2A820C08-3A0C-45F7-9143-270D68487461}"/>
               </a:ext>
             </a:extLst>
           </p:cNvPr>
@@ -8935,7 +8950,7 @@
           <p:cNvPr id="5" name="Straight Connector 4">
             <a:extLst>
               <a:ext uri="{FF2B5EF4-FFF2-40B4-BE49-F238E27FC236}">
-                <a16:creationId xmlns:a16="http://schemas.microsoft.com/office/drawing/2014/main" id="{0CDE77F3-B01F-4BBD-B350-05B9EECE271B}"/>
+                <a16:creationId xmlns:a16="http://schemas.microsoft.com/office/drawing/2014/main" xmlns="" id="{0CDE77F3-B01F-4BBD-B350-05B9EECE271B}"/>
               </a:ext>
             </a:extLst>
           </p:cNvPr>
@@ -8978,7 +8993,7 @@
           <p:cNvPr id="14" name="TextBox 13">
             <a:extLst>
               <a:ext uri="{FF2B5EF4-FFF2-40B4-BE49-F238E27FC236}">
-                <a16:creationId xmlns:a16="http://schemas.microsoft.com/office/drawing/2014/main" id="{95811153-9823-4B0B-B6BD-31546966EAF8}"/>
+                <a16:creationId xmlns:a16="http://schemas.microsoft.com/office/drawing/2014/main" xmlns="" id="{95811153-9823-4B0B-B6BD-31546966EAF8}"/>
               </a:ext>
             </a:extLst>
           </p:cNvPr>
@@ -9025,7 +9040,7 @@
           <p:cNvPr id="15" name="TextBox 14">
             <a:extLst>
               <a:ext uri="{FF2B5EF4-FFF2-40B4-BE49-F238E27FC236}">
-                <a16:creationId xmlns:a16="http://schemas.microsoft.com/office/drawing/2014/main" id="{17EEE99E-6CC3-4FC4-8C22-8405A38198E9}"/>
+                <a16:creationId xmlns:a16="http://schemas.microsoft.com/office/drawing/2014/main" xmlns="" id="{17EEE99E-6CC3-4FC4-8C22-8405A38198E9}"/>
               </a:ext>
             </a:extLst>
           </p:cNvPr>
@@ -9067,7 +9082,7 @@
           <p:cNvPr id="16" name="TextBox 15">
             <a:extLst>
               <a:ext uri="{FF2B5EF4-FFF2-40B4-BE49-F238E27FC236}">
-                <a16:creationId xmlns:a16="http://schemas.microsoft.com/office/drawing/2014/main" id="{229247EF-0DEF-4C56-BF2A-BA83E02B9506}"/>
+                <a16:creationId xmlns:a16="http://schemas.microsoft.com/office/drawing/2014/main" xmlns="" id="{229247EF-0DEF-4C56-BF2A-BA83E02B9506}"/>
               </a:ext>
             </a:extLst>
           </p:cNvPr>
@@ -9135,7 +9150,7 @@
           <p:cNvPr id="1026" name="Picture 2" descr="Anaconda">
             <a:extLst>
               <a:ext uri="{FF2B5EF4-FFF2-40B4-BE49-F238E27FC236}">
-                <a16:creationId xmlns:a16="http://schemas.microsoft.com/office/drawing/2014/main" id="{1AFA90E8-3000-46BE-856E-9B70AD5865B0}"/>
+                <a16:creationId xmlns:a16="http://schemas.microsoft.com/office/drawing/2014/main" xmlns="" id="{1AFA90E8-3000-46BE-856E-9B70AD5865B0}"/>
               </a:ext>
             </a:extLst>
           </p:cNvPr>
@@ -9212,7 +9227,7 @@
           <p:cNvPr id="2" name="Title 1">
             <a:extLst>
               <a:ext uri="{FF2B5EF4-FFF2-40B4-BE49-F238E27FC236}">
-                <a16:creationId xmlns:a16="http://schemas.microsoft.com/office/drawing/2014/main" id="{5AA1839F-4B47-4742-B67D-08D43ED62A55}"/>
+                <a16:creationId xmlns:a16="http://schemas.microsoft.com/office/drawing/2014/main" xmlns="" id="{5AA1839F-4B47-4742-B67D-08D43ED62A55}"/>
               </a:ext>
             </a:extLst>
           </p:cNvPr>
@@ -9240,7 +9255,7 @@
           <p:cNvPr id="3" name="Footer Placeholder 2">
             <a:extLst>
               <a:ext uri="{FF2B5EF4-FFF2-40B4-BE49-F238E27FC236}">
-                <a16:creationId xmlns:a16="http://schemas.microsoft.com/office/drawing/2014/main" id="{BE9E9502-A6A6-4B66-9A36-5E2EA6B8FBE3}"/>
+                <a16:creationId xmlns:a16="http://schemas.microsoft.com/office/drawing/2014/main" xmlns="" id="{BE9E9502-A6A6-4B66-9A36-5E2EA6B8FBE3}"/>
               </a:ext>
             </a:extLst>
           </p:cNvPr>
@@ -9269,7 +9284,7 @@
           <p:cNvPr id="4" name="Straight Connector 3">
             <a:extLst>
               <a:ext uri="{FF2B5EF4-FFF2-40B4-BE49-F238E27FC236}">
-                <a16:creationId xmlns:a16="http://schemas.microsoft.com/office/drawing/2014/main" id="{47841E2D-AC33-4CB7-9379-EEE96F8C30B2}"/>
+                <a16:creationId xmlns:a16="http://schemas.microsoft.com/office/drawing/2014/main" xmlns="" id="{47841E2D-AC33-4CB7-9379-EEE96F8C30B2}"/>
               </a:ext>
             </a:extLst>
           </p:cNvPr>
@@ -9312,7 +9327,7 @@
           <p:cNvPr id="7" name="Picture 6">
             <a:extLst>
               <a:ext uri="{FF2B5EF4-FFF2-40B4-BE49-F238E27FC236}">
-                <a16:creationId xmlns:a16="http://schemas.microsoft.com/office/drawing/2014/main" id="{BD53C8D0-EA69-4678-A630-B441DDB16611}"/>
+                <a16:creationId xmlns:a16="http://schemas.microsoft.com/office/drawing/2014/main" xmlns="" id="{BD53C8D0-EA69-4678-A630-B441DDB16611}"/>
               </a:ext>
             </a:extLst>
           </p:cNvPr>
@@ -9371,7 +9386,7 @@
           <p:cNvPr id="2" name="Title 1">
             <a:extLst>
               <a:ext uri="{FF2B5EF4-FFF2-40B4-BE49-F238E27FC236}">
-                <a16:creationId xmlns:a16="http://schemas.microsoft.com/office/drawing/2014/main" id="{A881ABA4-A25E-426A-BEAF-55A9D58F0752}"/>
+                <a16:creationId xmlns:a16="http://schemas.microsoft.com/office/drawing/2014/main" xmlns="" id="{A881ABA4-A25E-426A-BEAF-55A9D58F0752}"/>
               </a:ext>
             </a:extLst>
           </p:cNvPr>
@@ -9404,7 +9419,7 @@
           <p:cNvPr id="3" name="Text Placeholder 2">
             <a:extLst>
               <a:ext uri="{FF2B5EF4-FFF2-40B4-BE49-F238E27FC236}">
-                <a16:creationId xmlns:a16="http://schemas.microsoft.com/office/drawing/2014/main" id="{AA8039F4-A134-4CA5-98C7-0EEBE72BBB69}"/>
+                <a16:creationId xmlns:a16="http://schemas.microsoft.com/office/drawing/2014/main" xmlns="" id="{AA8039F4-A134-4CA5-98C7-0EEBE72BBB69}"/>
               </a:ext>
             </a:extLst>
           </p:cNvPr>
@@ -9440,7 +9455,7 @@
           <p:cNvPr id="4" name="Footer Placeholder 3">
             <a:extLst>
               <a:ext uri="{FF2B5EF4-FFF2-40B4-BE49-F238E27FC236}">
-                <a16:creationId xmlns:a16="http://schemas.microsoft.com/office/drawing/2014/main" id="{1031DABE-449F-417B-8F3E-C9D4D1C73A86}"/>
+                <a16:creationId xmlns:a16="http://schemas.microsoft.com/office/drawing/2014/main" xmlns="" id="{1031DABE-449F-417B-8F3E-C9D4D1C73A86}"/>
               </a:ext>
             </a:extLst>
           </p:cNvPr>
@@ -9499,7 +9514,7 @@
           <p:cNvPr id="2050" name="Picture 2" descr="Image result for jupyter logo">
             <a:extLst>
               <a:ext uri="{FF2B5EF4-FFF2-40B4-BE49-F238E27FC236}">
-                <a16:creationId xmlns:a16="http://schemas.microsoft.com/office/drawing/2014/main" id="{0F2B1981-E02E-4885-B338-08B7A8402795}"/>
+                <a16:creationId xmlns:a16="http://schemas.microsoft.com/office/drawing/2014/main" xmlns="" id="{0F2B1981-E02E-4885-B338-08B7A8402795}"/>
               </a:ext>
             </a:extLst>
           </p:cNvPr>
@@ -9546,7 +9561,7 @@
           <p:cNvPr id="2" name="Title 1">
             <a:extLst>
               <a:ext uri="{FF2B5EF4-FFF2-40B4-BE49-F238E27FC236}">
-                <a16:creationId xmlns:a16="http://schemas.microsoft.com/office/drawing/2014/main" id="{C6ECD56D-A84B-4778-9126-C7E99ABCA82C}"/>
+                <a16:creationId xmlns:a16="http://schemas.microsoft.com/office/drawing/2014/main" xmlns="" id="{C6ECD56D-A84B-4778-9126-C7E99ABCA82C}"/>
               </a:ext>
             </a:extLst>
           </p:cNvPr>
@@ -9579,7 +9594,7 @@
           <p:cNvPr id="4" name="Footer Placeholder 3">
             <a:extLst>
               <a:ext uri="{FF2B5EF4-FFF2-40B4-BE49-F238E27FC236}">
-                <a16:creationId xmlns:a16="http://schemas.microsoft.com/office/drawing/2014/main" id="{2A820C08-3A0C-45F7-9143-270D68487461}"/>
+                <a16:creationId xmlns:a16="http://schemas.microsoft.com/office/drawing/2014/main" xmlns="" id="{2A820C08-3A0C-45F7-9143-270D68487461}"/>
               </a:ext>
             </a:extLst>
           </p:cNvPr>
@@ -9608,7 +9623,7 @@
           <p:cNvPr id="5" name="Straight Connector 4">
             <a:extLst>
               <a:ext uri="{FF2B5EF4-FFF2-40B4-BE49-F238E27FC236}">
-                <a16:creationId xmlns:a16="http://schemas.microsoft.com/office/drawing/2014/main" id="{1ABD8992-2624-4A5D-B637-DEABC14C2F17}"/>
+                <a16:creationId xmlns:a16="http://schemas.microsoft.com/office/drawing/2014/main" xmlns="" id="{1ABD8992-2624-4A5D-B637-DEABC14C2F17}"/>
               </a:ext>
             </a:extLst>
           </p:cNvPr>
@@ -9651,7 +9666,7 @@
           <p:cNvPr id="8" name="TextBox 7">
             <a:extLst>
               <a:ext uri="{FF2B5EF4-FFF2-40B4-BE49-F238E27FC236}">
-                <a16:creationId xmlns:a16="http://schemas.microsoft.com/office/drawing/2014/main" id="{927E1F9F-F478-4C42-AAF9-AC47911325BF}"/>
+                <a16:creationId xmlns:a16="http://schemas.microsoft.com/office/drawing/2014/main" xmlns="" id="{927E1F9F-F478-4C42-AAF9-AC47911325BF}"/>
               </a:ext>
             </a:extLst>
           </p:cNvPr>
@@ -9690,7 +9705,7 @@
           <p:cNvPr id="10" name="TextBox 9">
             <a:extLst>
               <a:ext uri="{FF2B5EF4-FFF2-40B4-BE49-F238E27FC236}">
-                <a16:creationId xmlns:a16="http://schemas.microsoft.com/office/drawing/2014/main" id="{764AAADB-FF0D-4AFE-B0DC-EACD6457C13E}"/>
+                <a16:creationId xmlns:a16="http://schemas.microsoft.com/office/drawing/2014/main" xmlns="" id="{764AAADB-FF0D-4AFE-B0DC-EACD6457C13E}"/>
               </a:ext>
             </a:extLst>
           </p:cNvPr>
@@ -9753,7 +9768,7 @@
           <p:cNvPr id="9" name="Picture 8">
             <a:extLst>
               <a:ext uri="{FF2B5EF4-FFF2-40B4-BE49-F238E27FC236}">
-                <a16:creationId xmlns:a16="http://schemas.microsoft.com/office/drawing/2014/main" id="{830986C9-EDB4-4622-BC66-1C3C6CF65456}"/>
+                <a16:creationId xmlns:a16="http://schemas.microsoft.com/office/drawing/2014/main" xmlns="" id="{830986C9-EDB4-4622-BC66-1C3C6CF65456}"/>
               </a:ext>
             </a:extLst>
           </p:cNvPr>
@@ -9782,7 +9797,7 @@
           <p:cNvPr id="11" name="Arrow: Curved Up 10">
             <a:extLst>
               <a:ext uri="{FF2B5EF4-FFF2-40B4-BE49-F238E27FC236}">
-                <a16:creationId xmlns:a16="http://schemas.microsoft.com/office/drawing/2014/main" id="{2BA836D4-37DF-4952-A4CA-4531DE1B7F02}"/>
+                <a16:creationId xmlns:a16="http://schemas.microsoft.com/office/drawing/2014/main" xmlns="" id="{2BA836D4-37DF-4952-A4CA-4531DE1B7F02}"/>
               </a:ext>
             </a:extLst>
           </p:cNvPr>
@@ -9842,7 +9857,7 @@
           <p:cNvPr id="13" name="Rectangle 12">
             <a:extLst>
               <a:ext uri="{FF2B5EF4-FFF2-40B4-BE49-F238E27FC236}">
-                <a16:creationId xmlns:a16="http://schemas.microsoft.com/office/drawing/2014/main" id="{945C0BB0-B509-42D7-B04E-55BBC8A43E30}"/>
+                <a16:creationId xmlns:a16="http://schemas.microsoft.com/office/drawing/2014/main" xmlns="" id="{945C0BB0-B509-42D7-B04E-55BBC8A43E30}"/>
               </a:ext>
             </a:extLst>
           </p:cNvPr>
@@ -9894,7 +9909,7 @@
           <p:cNvPr id="12" name="TextBox 11">
             <a:extLst>
               <a:ext uri="{FF2B5EF4-FFF2-40B4-BE49-F238E27FC236}">
-                <a16:creationId xmlns:a16="http://schemas.microsoft.com/office/drawing/2014/main" id="{35C19750-4F17-4E39-AB3C-097E1E6B902B}"/>
+                <a16:creationId xmlns:a16="http://schemas.microsoft.com/office/drawing/2014/main" xmlns="" id="{35C19750-4F17-4E39-AB3C-097E1E6B902B}"/>
               </a:ext>
             </a:extLst>
           </p:cNvPr>
@@ -9985,7 +10000,7 @@
           <p:cNvPr id="2" name="Title 1">
             <a:extLst>
               <a:ext uri="{FF2B5EF4-FFF2-40B4-BE49-F238E27FC236}">
-                <a16:creationId xmlns:a16="http://schemas.microsoft.com/office/drawing/2014/main" id="{5AA1839F-4B47-4742-B67D-08D43ED62A55}"/>
+                <a16:creationId xmlns:a16="http://schemas.microsoft.com/office/drawing/2014/main" xmlns="" id="{5AA1839F-4B47-4742-B67D-08D43ED62A55}"/>
               </a:ext>
             </a:extLst>
           </p:cNvPr>
@@ -10017,7 +10032,7 @@
           <p:cNvPr id="3" name="Footer Placeholder 2">
             <a:extLst>
               <a:ext uri="{FF2B5EF4-FFF2-40B4-BE49-F238E27FC236}">
-                <a16:creationId xmlns:a16="http://schemas.microsoft.com/office/drawing/2014/main" id="{BE9E9502-A6A6-4B66-9A36-5E2EA6B8FBE3}"/>
+                <a16:creationId xmlns:a16="http://schemas.microsoft.com/office/drawing/2014/main" xmlns="" id="{BE9E9502-A6A6-4B66-9A36-5E2EA6B8FBE3}"/>
               </a:ext>
             </a:extLst>
           </p:cNvPr>
@@ -10046,7 +10061,7 @@
           <p:cNvPr id="4" name="Straight Connector 3">
             <a:extLst>
               <a:ext uri="{FF2B5EF4-FFF2-40B4-BE49-F238E27FC236}">
-                <a16:creationId xmlns:a16="http://schemas.microsoft.com/office/drawing/2014/main" id="{47841E2D-AC33-4CB7-9379-EEE96F8C30B2}"/>
+                <a16:creationId xmlns:a16="http://schemas.microsoft.com/office/drawing/2014/main" xmlns="" id="{47841E2D-AC33-4CB7-9379-EEE96F8C30B2}"/>
               </a:ext>
             </a:extLst>
           </p:cNvPr>
@@ -10089,7 +10104,7 @@
           <p:cNvPr id="6" name="Picture 5">
             <a:extLst>
               <a:ext uri="{FF2B5EF4-FFF2-40B4-BE49-F238E27FC236}">
-                <a16:creationId xmlns:a16="http://schemas.microsoft.com/office/drawing/2014/main" id="{47B79B51-3B43-44E4-A386-94497FCC5A0E}"/>
+                <a16:creationId xmlns:a16="http://schemas.microsoft.com/office/drawing/2014/main" xmlns="" id="{47B79B51-3B43-44E4-A386-94497FCC5A0E}"/>
               </a:ext>
             </a:extLst>
           </p:cNvPr>
@@ -10125,7 +10140,7 @@
           <p:cNvPr id="8" name="Picture 7">
             <a:extLst>
               <a:ext uri="{FF2B5EF4-FFF2-40B4-BE49-F238E27FC236}">
-                <a16:creationId xmlns:a16="http://schemas.microsoft.com/office/drawing/2014/main" id="{E397B53B-38EE-4C82-9A45-A38049313877}"/>
+                <a16:creationId xmlns:a16="http://schemas.microsoft.com/office/drawing/2014/main" xmlns="" id="{E397B53B-38EE-4C82-9A45-A38049313877}"/>
               </a:ext>
             </a:extLst>
           </p:cNvPr>
@@ -10782,7 +10797,7 @@
     </a:clrScheme>
     <a:fontScheme name="Office">
       <a:majorFont>
-        <a:latin typeface="Calibri Light" panose="020F0302020204030204"/>
+        <a:latin typeface="Calibri Light"/>
         <a:ea typeface=""/>
         <a:cs typeface=""/>
         <a:font script="Jpan" typeface="游ゴシック Light"/>
@@ -10834,7 +10849,7 @@
         <a:font script="Tfng" typeface="Ebrima"/>
       </a:majorFont>
       <a:minorFont>
-        <a:latin typeface="Calibri" panose="020F0502020204030204"/>
+        <a:latin typeface="Calibri"/>
         <a:ea typeface=""/>
         <a:cs typeface=""/>
         <a:font script="Jpan" typeface="游ゴシック"/>
@@ -11028,7 +11043,7 @@
   <a:extraClrSchemeLst/>
   <a:extLst>
     <a:ext uri="{05A4C25C-085E-4340-85A3-A5531E510DB2}">
-      <thm15:themeFamily xmlns:thm15="http://schemas.microsoft.com/office/thememl/2012/main" name="Office Theme" id="{62F939B6-93AF-4DB8-9C6B-D6C7DFDC589F}" vid="{4A3C46E8-61CC-4603-A589-7422A47A8E4A}"/>
+      <thm15:themeFamily xmlns:thm15="http://schemas.microsoft.com/office/thememl/2012/main" xmlns="" name="Office Theme" id="{62F939B6-93AF-4DB8-9C6B-D6C7DFDC589F}" vid="{4A3C46E8-61CC-4603-A589-7422A47A8E4A}"/>
     </a:ext>
   </a:extLst>
 </a:theme>

</xml_diff>